<commit_message>
edits to Amstat News article
</commit_message>
<xml_diff>
--- a/skillsForResearch_JSM17_JoHardin.pptx
+++ b/skillsForResearch_JSM17_JoHardin.pptx
@@ -4,6 +4,9 @@
   <p:sldMasterIdLst>
     <p:sldMasterId id="2147483660" r:id="rId1"/>
   </p:sldMasterIdLst>
+  <p:notesMasterIdLst>
+    <p:notesMasterId r:id="rId13"/>
+  </p:notesMasterIdLst>
   <p:sldIdLst>
     <p:sldId id="256" r:id="rId2"/>
     <p:sldId id="257" r:id="rId3"/>
@@ -115,6 +118,903 @@
     </a:lvl9pPr>
   </p:defaultTextStyle>
 </p:presentation>
+</file>
+
+<file path=ppt/notesMasters/notesMaster1.xml><?xml version="1.0" encoding="utf-8"?>
+<p:notesMaster xmlns:a="http://schemas.openxmlformats.org/drawingml/2006/main" xmlns:r="http://schemas.openxmlformats.org/officeDocument/2006/relationships" xmlns:p="http://schemas.openxmlformats.org/presentationml/2006/main">
+  <p:cSld>
+    <p:bg>
+      <p:bgRef idx="1001">
+        <a:schemeClr val="bg1"/>
+      </p:bgRef>
+    </p:bg>
+    <p:spTree>
+      <p:nvGrpSpPr>
+        <p:cNvPr id="1" name=""/>
+        <p:cNvGrpSpPr/>
+        <p:nvPr/>
+      </p:nvGrpSpPr>
+      <p:grpSpPr>
+        <a:xfrm>
+          <a:off x="0" y="0"/>
+          <a:ext cx="0" cy="0"/>
+          <a:chOff x="0" y="0"/>
+          <a:chExt cx="0" cy="0"/>
+        </a:xfrm>
+      </p:grpSpPr>
+      <p:sp>
+        <p:nvSpPr>
+          <p:cNvPr id="2" name="Header Placeholder 1"/>
+          <p:cNvSpPr>
+            <a:spLocks noGrp="1"/>
+          </p:cNvSpPr>
+          <p:nvPr>
+            <p:ph type="hdr" sz="quarter"/>
+          </p:nvPr>
+        </p:nvSpPr>
+        <p:spPr>
+          <a:xfrm>
+            <a:off x="0" y="0"/>
+            <a:ext cx="2971800" cy="457200"/>
+          </a:xfrm>
+          <a:prstGeom prst="rect">
+            <a:avLst/>
+          </a:prstGeom>
+        </p:spPr>
+        <p:txBody>
+          <a:bodyPr vert="horz" lIns="91440" tIns="45720" rIns="91440" bIns="45720" rtlCol="0"/>
+          <a:lstStyle>
+            <a:lvl1pPr algn="l">
+              <a:defRPr sz="1200"/>
+            </a:lvl1pPr>
+          </a:lstStyle>
+          <a:p>
+            <a:endParaRPr lang="en-US"/>
+          </a:p>
+        </p:txBody>
+      </p:sp>
+      <p:sp>
+        <p:nvSpPr>
+          <p:cNvPr id="3" name="Date Placeholder 2"/>
+          <p:cNvSpPr>
+            <a:spLocks noGrp="1"/>
+          </p:cNvSpPr>
+          <p:nvPr>
+            <p:ph type="dt" idx="1"/>
+          </p:nvPr>
+        </p:nvSpPr>
+        <p:spPr>
+          <a:xfrm>
+            <a:off x="3884613" y="0"/>
+            <a:ext cx="2971800" cy="457200"/>
+          </a:xfrm>
+          <a:prstGeom prst="rect">
+            <a:avLst/>
+          </a:prstGeom>
+        </p:spPr>
+        <p:txBody>
+          <a:bodyPr vert="horz" lIns="91440" tIns="45720" rIns="91440" bIns="45720" rtlCol="0"/>
+          <a:lstStyle>
+            <a:lvl1pPr algn="r">
+              <a:defRPr sz="1200"/>
+            </a:lvl1pPr>
+          </a:lstStyle>
+          <a:p>
+            <a:fld id="{51F23AE1-7BC9-1746-961C-E0E2DE455D32}" type="datetimeFigureOut">
+              <a:rPr lang="en-US" smtClean="0"/>
+              <a:t>7/10/17</a:t>
+            </a:fld>
+            <a:endParaRPr lang="en-US"/>
+          </a:p>
+        </p:txBody>
+      </p:sp>
+      <p:sp>
+        <p:nvSpPr>
+          <p:cNvPr id="4" name="Slide Image Placeholder 3"/>
+          <p:cNvSpPr>
+            <a:spLocks noGrp="1" noRot="1" noChangeAspect="1"/>
+          </p:cNvSpPr>
+          <p:nvPr>
+            <p:ph type="sldImg" idx="2"/>
+          </p:nvPr>
+        </p:nvSpPr>
+        <p:spPr>
+          <a:xfrm>
+            <a:off x="1143000" y="685800"/>
+            <a:ext cx="4572000" cy="3429000"/>
+          </a:xfrm>
+          <a:prstGeom prst="rect">
+            <a:avLst/>
+          </a:prstGeom>
+          <a:noFill/>
+          <a:ln w="12700">
+            <a:solidFill>
+              <a:prstClr val="black"/>
+            </a:solidFill>
+          </a:ln>
+        </p:spPr>
+        <p:txBody>
+          <a:bodyPr vert="horz" lIns="91440" tIns="45720" rIns="91440" bIns="45720" rtlCol="0" anchor="ctr"/>
+          <a:lstStyle/>
+          <a:p>
+            <a:endParaRPr lang="en-US"/>
+          </a:p>
+        </p:txBody>
+      </p:sp>
+      <p:sp>
+        <p:nvSpPr>
+          <p:cNvPr id="5" name="Notes Placeholder 4"/>
+          <p:cNvSpPr>
+            <a:spLocks noGrp="1"/>
+          </p:cNvSpPr>
+          <p:nvPr>
+            <p:ph type="body" sz="quarter" idx="3"/>
+          </p:nvPr>
+        </p:nvSpPr>
+        <p:spPr>
+          <a:xfrm>
+            <a:off x="685800" y="4343400"/>
+            <a:ext cx="5486400" cy="4114800"/>
+          </a:xfrm>
+          <a:prstGeom prst="rect">
+            <a:avLst/>
+          </a:prstGeom>
+        </p:spPr>
+        <p:txBody>
+          <a:bodyPr vert="horz" lIns="91440" tIns="45720" rIns="91440" bIns="45720" rtlCol="0"/>
+          <a:lstStyle/>
+          <a:p>
+            <a:pPr lvl="0"/>
+            <a:r>
+              <a:rPr lang="en-US" smtClean="0"/>
+              <a:t>Click to edit Master text styles</a:t>
+            </a:r>
+          </a:p>
+          <a:p>
+            <a:pPr lvl="1"/>
+            <a:r>
+              <a:rPr lang="en-US" smtClean="0"/>
+              <a:t>Second level</a:t>
+            </a:r>
+          </a:p>
+          <a:p>
+            <a:pPr lvl="2"/>
+            <a:r>
+              <a:rPr lang="en-US" smtClean="0"/>
+              <a:t>Third level</a:t>
+            </a:r>
+          </a:p>
+          <a:p>
+            <a:pPr lvl="3"/>
+            <a:r>
+              <a:rPr lang="en-US" smtClean="0"/>
+              <a:t>Fourth level</a:t>
+            </a:r>
+          </a:p>
+          <a:p>
+            <a:pPr lvl="4"/>
+            <a:r>
+              <a:rPr lang="en-US" smtClean="0"/>
+              <a:t>Fifth level</a:t>
+            </a:r>
+            <a:endParaRPr lang="en-US"/>
+          </a:p>
+        </p:txBody>
+      </p:sp>
+      <p:sp>
+        <p:nvSpPr>
+          <p:cNvPr id="6" name="Footer Placeholder 5"/>
+          <p:cNvSpPr>
+            <a:spLocks noGrp="1"/>
+          </p:cNvSpPr>
+          <p:nvPr>
+            <p:ph type="ftr" sz="quarter" idx="4"/>
+          </p:nvPr>
+        </p:nvSpPr>
+        <p:spPr>
+          <a:xfrm>
+            <a:off x="0" y="8685213"/>
+            <a:ext cx="2971800" cy="457200"/>
+          </a:xfrm>
+          <a:prstGeom prst="rect">
+            <a:avLst/>
+          </a:prstGeom>
+        </p:spPr>
+        <p:txBody>
+          <a:bodyPr vert="horz" lIns="91440" tIns="45720" rIns="91440" bIns="45720" rtlCol="0" anchor="b"/>
+          <a:lstStyle>
+            <a:lvl1pPr algn="l">
+              <a:defRPr sz="1200"/>
+            </a:lvl1pPr>
+          </a:lstStyle>
+          <a:p>
+            <a:endParaRPr lang="en-US"/>
+          </a:p>
+        </p:txBody>
+      </p:sp>
+      <p:sp>
+        <p:nvSpPr>
+          <p:cNvPr id="7" name="Slide Number Placeholder 6"/>
+          <p:cNvSpPr>
+            <a:spLocks noGrp="1"/>
+          </p:cNvSpPr>
+          <p:nvPr>
+            <p:ph type="sldNum" sz="quarter" idx="5"/>
+          </p:nvPr>
+        </p:nvSpPr>
+        <p:spPr>
+          <a:xfrm>
+            <a:off x="3884613" y="8685213"/>
+            <a:ext cx="2971800" cy="457200"/>
+          </a:xfrm>
+          <a:prstGeom prst="rect">
+            <a:avLst/>
+          </a:prstGeom>
+        </p:spPr>
+        <p:txBody>
+          <a:bodyPr vert="horz" lIns="91440" tIns="45720" rIns="91440" bIns="45720" rtlCol="0" anchor="b"/>
+          <a:lstStyle>
+            <a:lvl1pPr algn="r">
+              <a:defRPr sz="1200"/>
+            </a:lvl1pPr>
+          </a:lstStyle>
+          <a:p>
+            <a:fld id="{319DAD61-181C-6A4B-864E-25751DEDD2BB}" type="slidenum">
+              <a:rPr lang="en-US" smtClean="0"/>
+              <a:t>‹#›</a:t>
+            </a:fld>
+            <a:endParaRPr lang="en-US"/>
+          </a:p>
+        </p:txBody>
+      </p:sp>
+    </p:spTree>
+    <p:extLst>
+      <p:ext uri="{BB962C8B-B14F-4D97-AF65-F5344CB8AC3E}">
+        <p14:creationId xmlns:p14="http://schemas.microsoft.com/office/powerpoint/2010/main" val="35371783"/>
+      </p:ext>
+    </p:extLst>
+  </p:cSld>
+  <p:clrMap bg1="lt1" tx1="dk1" bg2="lt2" tx2="dk2" accent1="accent1" accent2="accent2" accent3="accent3" accent4="accent4" accent5="accent5" accent6="accent6" hlink="hlink" folHlink="folHlink"/>
+  <p:notesStyle>
+    <a:lvl1pPr marL="0" algn="l" defTabSz="457200" rtl="0" eaLnBrk="1" latinLnBrk="0" hangingPunct="1">
+      <a:defRPr sz="1200" kern="1200">
+        <a:solidFill>
+          <a:schemeClr val="tx1"/>
+        </a:solidFill>
+        <a:latin typeface="+mn-lt"/>
+        <a:ea typeface="+mn-ea"/>
+        <a:cs typeface="+mn-cs"/>
+      </a:defRPr>
+    </a:lvl1pPr>
+    <a:lvl2pPr marL="457200" algn="l" defTabSz="457200" rtl="0" eaLnBrk="1" latinLnBrk="0" hangingPunct="1">
+      <a:defRPr sz="1200" kern="1200">
+        <a:solidFill>
+          <a:schemeClr val="tx1"/>
+        </a:solidFill>
+        <a:latin typeface="+mn-lt"/>
+        <a:ea typeface="+mn-ea"/>
+        <a:cs typeface="+mn-cs"/>
+      </a:defRPr>
+    </a:lvl2pPr>
+    <a:lvl3pPr marL="914400" algn="l" defTabSz="457200" rtl="0" eaLnBrk="1" latinLnBrk="0" hangingPunct="1">
+      <a:defRPr sz="1200" kern="1200">
+        <a:solidFill>
+          <a:schemeClr val="tx1"/>
+        </a:solidFill>
+        <a:latin typeface="+mn-lt"/>
+        <a:ea typeface="+mn-ea"/>
+        <a:cs typeface="+mn-cs"/>
+      </a:defRPr>
+    </a:lvl3pPr>
+    <a:lvl4pPr marL="1371600" algn="l" defTabSz="457200" rtl="0" eaLnBrk="1" latinLnBrk="0" hangingPunct="1">
+      <a:defRPr sz="1200" kern="1200">
+        <a:solidFill>
+          <a:schemeClr val="tx1"/>
+        </a:solidFill>
+        <a:latin typeface="+mn-lt"/>
+        <a:ea typeface="+mn-ea"/>
+        <a:cs typeface="+mn-cs"/>
+      </a:defRPr>
+    </a:lvl4pPr>
+    <a:lvl5pPr marL="1828800" algn="l" defTabSz="457200" rtl="0" eaLnBrk="1" latinLnBrk="0" hangingPunct="1">
+      <a:defRPr sz="1200" kern="1200">
+        <a:solidFill>
+          <a:schemeClr val="tx1"/>
+        </a:solidFill>
+        <a:latin typeface="+mn-lt"/>
+        <a:ea typeface="+mn-ea"/>
+        <a:cs typeface="+mn-cs"/>
+      </a:defRPr>
+    </a:lvl5pPr>
+    <a:lvl6pPr marL="2286000" algn="l" defTabSz="457200" rtl="0" eaLnBrk="1" latinLnBrk="0" hangingPunct="1">
+      <a:defRPr sz="1200" kern="1200">
+        <a:solidFill>
+          <a:schemeClr val="tx1"/>
+        </a:solidFill>
+        <a:latin typeface="+mn-lt"/>
+        <a:ea typeface="+mn-ea"/>
+        <a:cs typeface="+mn-cs"/>
+      </a:defRPr>
+    </a:lvl6pPr>
+    <a:lvl7pPr marL="2743200" algn="l" defTabSz="457200" rtl="0" eaLnBrk="1" latinLnBrk="0" hangingPunct="1">
+      <a:defRPr sz="1200" kern="1200">
+        <a:solidFill>
+          <a:schemeClr val="tx1"/>
+        </a:solidFill>
+        <a:latin typeface="+mn-lt"/>
+        <a:ea typeface="+mn-ea"/>
+        <a:cs typeface="+mn-cs"/>
+      </a:defRPr>
+    </a:lvl7pPr>
+    <a:lvl8pPr marL="3200400" algn="l" defTabSz="457200" rtl="0" eaLnBrk="1" latinLnBrk="0" hangingPunct="1">
+      <a:defRPr sz="1200" kern="1200">
+        <a:solidFill>
+          <a:schemeClr val="tx1"/>
+        </a:solidFill>
+        <a:latin typeface="+mn-lt"/>
+        <a:ea typeface="+mn-ea"/>
+        <a:cs typeface="+mn-cs"/>
+      </a:defRPr>
+    </a:lvl8pPr>
+    <a:lvl9pPr marL="3657600" algn="l" defTabSz="457200" rtl="0" eaLnBrk="1" latinLnBrk="0" hangingPunct="1">
+      <a:defRPr sz="1200" kern="1200">
+        <a:solidFill>
+          <a:schemeClr val="tx1"/>
+        </a:solidFill>
+        <a:latin typeface="+mn-lt"/>
+        <a:ea typeface="+mn-ea"/>
+        <a:cs typeface="+mn-cs"/>
+      </a:defRPr>
+    </a:lvl9pPr>
+  </p:notesStyle>
+</p:notesMaster>
+</file>
+
+<file path=ppt/notesSlides/notesSlide1.xml><?xml version="1.0" encoding="utf-8"?>
+<p:notes xmlns:a="http://schemas.openxmlformats.org/drawingml/2006/main" xmlns:r="http://schemas.openxmlformats.org/officeDocument/2006/relationships" xmlns:p="http://schemas.openxmlformats.org/presentationml/2006/main">
+  <p:cSld>
+    <p:spTree>
+      <p:nvGrpSpPr>
+        <p:cNvPr id="1" name=""/>
+        <p:cNvGrpSpPr/>
+        <p:nvPr/>
+      </p:nvGrpSpPr>
+      <p:grpSpPr>
+        <a:xfrm>
+          <a:off x="0" y="0"/>
+          <a:ext cx="0" cy="0"/>
+          <a:chOff x="0" y="0"/>
+          <a:chExt cx="0" cy="0"/>
+        </a:xfrm>
+      </p:grpSpPr>
+      <p:sp>
+        <p:nvSpPr>
+          <p:cNvPr id="2" name="Slide Image Placeholder 1"/>
+          <p:cNvSpPr>
+            <a:spLocks noGrp="1" noRot="1" noChangeAspect="1"/>
+          </p:cNvSpPr>
+          <p:nvPr>
+            <p:ph type="sldImg"/>
+          </p:nvPr>
+        </p:nvSpPr>
+        <p:spPr/>
+      </p:sp>
+      <p:sp>
+        <p:nvSpPr>
+          <p:cNvPr id="3" name="Notes Placeholder 2"/>
+          <p:cNvSpPr>
+            <a:spLocks noGrp="1"/>
+          </p:cNvSpPr>
+          <p:nvPr>
+            <p:ph type="body" idx="1"/>
+          </p:nvPr>
+        </p:nvSpPr>
+        <p:spPr/>
+        <p:txBody>
+          <a:bodyPr/>
+          <a:lstStyle/>
+          <a:p>
+            <a:pPr marL="0" marR="0" indent="0" algn="l" defTabSz="457200" rtl="0" eaLnBrk="1" fontAlgn="auto" latinLnBrk="0" hangingPunct="1">
+              <a:lnSpc>
+                <a:spcPct val="100000"/>
+              </a:lnSpc>
+              <a:spcBef>
+                <a:spcPts val="0"/>
+              </a:spcBef>
+              <a:spcAft>
+                <a:spcPts val="0"/>
+              </a:spcAft>
+              <a:buClrTx/>
+              <a:buSzTx/>
+              <a:buFontTx/>
+              <a:buNone/>
+              <a:tabLst/>
+              <a:defRPr/>
+            </a:pPr>
+            <a:r>
+              <a:rPr lang="en-US" sz="1200" kern="1200" dirty="0" smtClean="0">
+                <a:solidFill>
+                  <a:schemeClr val="tx1"/>
+                </a:solidFill>
+                <a:effectLst/>
+                <a:latin typeface="+mn-lt"/>
+                <a:ea typeface="+mn-ea"/>
+                <a:cs typeface="+mn-cs"/>
+              </a:rPr>
+              <a:t>One of my recent projects involves creating prediction intervals for a random forest model.  The novelty comes from the derivation of the appropriate standard error.  There are a handful (not many) of papers on the topic, a few very theoretical papers and a few who approach the problem in a different applied way.  My student and I have had to work through </a:t>
+            </a:r>
+            <a:r>
+              <a:rPr lang="en-US" sz="1200" i="1" kern="1200" dirty="0" smtClean="0">
+                <a:solidFill>
+                  <a:schemeClr val="tx1"/>
+                </a:solidFill>
+                <a:effectLst/>
+                <a:latin typeface="+mn-lt"/>
+                <a:ea typeface="+mn-ea"/>
+                <a:cs typeface="+mn-cs"/>
+              </a:rPr>
+              <a:t>how </a:t>
+            </a:r>
+            <a:r>
+              <a:rPr lang="en-US" sz="1200" kern="1200" dirty="0" smtClean="0">
+                <a:solidFill>
+                  <a:schemeClr val="tx1"/>
+                </a:solidFill>
+                <a:effectLst/>
+                <a:latin typeface="+mn-lt"/>
+                <a:ea typeface="+mn-ea"/>
+                <a:cs typeface="+mn-cs"/>
+              </a:rPr>
+              <a:t>our ideas add to the literature and </a:t>
+            </a:r>
+            <a:r>
+              <a:rPr lang="en-US" sz="1200" i="1" kern="1200" dirty="0" smtClean="0">
+                <a:solidFill>
+                  <a:schemeClr val="tx1"/>
+                </a:solidFill>
+                <a:effectLst/>
+                <a:latin typeface="+mn-lt"/>
+                <a:ea typeface="+mn-ea"/>
+                <a:cs typeface="+mn-cs"/>
+              </a:rPr>
+              <a:t>how</a:t>
+            </a:r>
+            <a:r>
+              <a:rPr lang="en-US" sz="1200" kern="1200" dirty="0" smtClean="0">
+                <a:solidFill>
+                  <a:schemeClr val="tx1"/>
+                </a:solidFill>
+                <a:effectLst/>
+                <a:latin typeface="+mn-lt"/>
+                <a:ea typeface="+mn-ea"/>
+                <a:cs typeface="+mn-cs"/>
+              </a:rPr>
+              <a:t> those ides can be synthesized into an argument.  Our conversations circle back repeatedly to “what are we trying to argue and how can we argue that effectively?”</a:t>
+            </a:r>
+          </a:p>
+          <a:p>
+            <a:endParaRPr lang="en-US" dirty="0"/>
+          </a:p>
+        </p:txBody>
+      </p:sp>
+      <p:sp>
+        <p:nvSpPr>
+          <p:cNvPr id="4" name="Slide Number Placeholder 3"/>
+          <p:cNvSpPr>
+            <a:spLocks noGrp="1"/>
+          </p:cNvSpPr>
+          <p:nvPr>
+            <p:ph type="sldNum" sz="quarter" idx="10"/>
+          </p:nvPr>
+        </p:nvSpPr>
+        <p:spPr/>
+        <p:txBody>
+          <a:bodyPr/>
+          <a:lstStyle/>
+          <a:p>
+            <a:fld id="{319DAD61-181C-6A4B-864E-25751DEDD2BB}" type="slidenum">
+              <a:rPr lang="en-US" smtClean="0"/>
+              <a:t>6</a:t>
+            </a:fld>
+            <a:endParaRPr lang="en-US"/>
+          </a:p>
+        </p:txBody>
+      </p:sp>
+    </p:spTree>
+    <p:extLst>
+      <p:ext uri="{BB962C8B-B14F-4D97-AF65-F5344CB8AC3E}">
+        <p14:creationId xmlns:p14="http://schemas.microsoft.com/office/powerpoint/2010/main" val="1830632137"/>
+      </p:ext>
+    </p:extLst>
+  </p:cSld>
+  <p:clrMapOvr>
+    <a:masterClrMapping/>
+  </p:clrMapOvr>
+</p:notes>
+</file>
+
+<file path=ppt/notesSlides/notesSlide2.xml><?xml version="1.0" encoding="utf-8"?>
+<p:notes xmlns:a="http://schemas.openxmlformats.org/drawingml/2006/main" xmlns:r="http://schemas.openxmlformats.org/officeDocument/2006/relationships" xmlns:p="http://schemas.openxmlformats.org/presentationml/2006/main">
+  <p:cSld>
+    <p:spTree>
+      <p:nvGrpSpPr>
+        <p:cNvPr id="1" name=""/>
+        <p:cNvGrpSpPr/>
+        <p:nvPr/>
+      </p:nvGrpSpPr>
+      <p:grpSpPr>
+        <a:xfrm>
+          <a:off x="0" y="0"/>
+          <a:ext cx="0" cy="0"/>
+          <a:chOff x="0" y="0"/>
+          <a:chExt cx="0" cy="0"/>
+        </a:xfrm>
+      </p:grpSpPr>
+      <p:sp>
+        <p:nvSpPr>
+          <p:cNvPr id="2" name="Slide Image Placeholder 1"/>
+          <p:cNvSpPr>
+            <a:spLocks noGrp="1" noRot="1" noChangeAspect="1"/>
+          </p:cNvSpPr>
+          <p:nvPr>
+            <p:ph type="sldImg"/>
+          </p:nvPr>
+        </p:nvSpPr>
+        <p:spPr/>
+      </p:sp>
+      <p:sp>
+        <p:nvSpPr>
+          <p:cNvPr id="3" name="Notes Placeholder 2"/>
+          <p:cNvSpPr>
+            <a:spLocks noGrp="1"/>
+          </p:cNvSpPr>
+          <p:nvPr>
+            <p:ph type="body" idx="1"/>
+          </p:nvPr>
+        </p:nvSpPr>
+        <p:spPr/>
+        <p:txBody>
+          <a:bodyPr/>
+          <a:lstStyle/>
+          <a:p>
+            <a:pPr marL="0" marR="0" indent="0" algn="l" defTabSz="457200" rtl="0" eaLnBrk="1" fontAlgn="auto" latinLnBrk="0" hangingPunct="1">
+              <a:lnSpc>
+                <a:spcPct val="100000"/>
+              </a:lnSpc>
+              <a:spcBef>
+                <a:spcPts val="0"/>
+              </a:spcBef>
+              <a:spcAft>
+                <a:spcPts val="0"/>
+              </a:spcAft>
+              <a:buClrTx/>
+              <a:buSzTx/>
+              <a:buFontTx/>
+              <a:buNone/>
+              <a:tabLst/>
+              <a:defRPr/>
+            </a:pPr>
+            <a:r>
+              <a:rPr lang="en-US" sz="1200" kern="1200" dirty="0" smtClean="0">
+                <a:solidFill>
+                  <a:schemeClr val="tx1"/>
+                </a:solidFill>
+                <a:effectLst/>
+                <a:latin typeface="+mn-lt"/>
+                <a:ea typeface="+mn-ea"/>
+                <a:cs typeface="+mn-cs"/>
+              </a:rPr>
+              <a:t>A recent project of mine used canonical correlation analysis to identify correlated </a:t>
+            </a:r>
+            <a:r>
+              <a:rPr lang="en-US" sz="1200" i="1" kern="1200" dirty="0" smtClean="0">
+                <a:solidFill>
+                  <a:schemeClr val="tx1"/>
+                </a:solidFill>
+                <a:effectLst/>
+                <a:latin typeface="+mn-lt"/>
+                <a:ea typeface="+mn-ea"/>
+                <a:cs typeface="+mn-cs"/>
+              </a:rPr>
+              <a:t>pairs </a:t>
+            </a:r>
+            <a:r>
+              <a:rPr lang="en-US" sz="1200" kern="1200" dirty="0" smtClean="0">
+                <a:solidFill>
+                  <a:schemeClr val="tx1"/>
+                </a:solidFill>
+                <a:effectLst/>
+                <a:latin typeface="+mn-lt"/>
+                <a:ea typeface="+mn-ea"/>
+                <a:cs typeface="+mn-cs"/>
+              </a:rPr>
+              <a:t> of linear combinations of variables.  The setting is sufficiently complicated that it would be difficult to find the theoretical distribution underlying each correlated linear combination (keeping in mind that each pair is also correlated with other pairs), but the analysis is not useful unless there is a way for the practitioner to know whether a large correlation is actually statistically significant.  We were able to derive a permutation algorithm to define significance (the method also doubled as a way to measure false positive and false negative rates).  The permutation method, however, was not trivial to implement, and it required that the students understood how the distributional aspects are determined by both the linear combinations as well as the complex correlation structures.</a:t>
+            </a:r>
+          </a:p>
+          <a:p>
+            <a:endParaRPr lang="en-US" dirty="0"/>
+          </a:p>
+        </p:txBody>
+      </p:sp>
+      <p:sp>
+        <p:nvSpPr>
+          <p:cNvPr id="4" name="Slide Number Placeholder 3"/>
+          <p:cNvSpPr>
+            <a:spLocks noGrp="1"/>
+          </p:cNvSpPr>
+          <p:nvPr>
+            <p:ph type="sldNum" sz="quarter" idx="10"/>
+          </p:nvPr>
+        </p:nvSpPr>
+        <p:spPr/>
+        <p:txBody>
+          <a:bodyPr/>
+          <a:lstStyle/>
+          <a:p>
+            <a:fld id="{319DAD61-181C-6A4B-864E-25751DEDD2BB}" type="slidenum">
+              <a:rPr lang="en-US" smtClean="0"/>
+              <a:t>7</a:t>
+            </a:fld>
+            <a:endParaRPr lang="en-US"/>
+          </a:p>
+        </p:txBody>
+      </p:sp>
+    </p:spTree>
+    <p:extLst>
+      <p:ext uri="{BB962C8B-B14F-4D97-AF65-F5344CB8AC3E}">
+        <p14:creationId xmlns:p14="http://schemas.microsoft.com/office/powerpoint/2010/main" val="238360480"/>
+      </p:ext>
+    </p:extLst>
+  </p:cSld>
+  <p:clrMapOvr>
+    <a:masterClrMapping/>
+  </p:clrMapOvr>
+</p:notes>
+</file>
+
+<file path=ppt/notesSlides/notesSlide3.xml><?xml version="1.0" encoding="utf-8"?>
+<p:notes xmlns:a="http://schemas.openxmlformats.org/drawingml/2006/main" xmlns:r="http://schemas.openxmlformats.org/officeDocument/2006/relationships" xmlns:p="http://schemas.openxmlformats.org/presentationml/2006/main">
+  <p:cSld>
+    <p:spTree>
+      <p:nvGrpSpPr>
+        <p:cNvPr id="1" name=""/>
+        <p:cNvGrpSpPr/>
+        <p:nvPr/>
+      </p:nvGrpSpPr>
+      <p:grpSpPr>
+        <a:xfrm>
+          <a:off x="0" y="0"/>
+          <a:ext cx="0" cy="0"/>
+          <a:chOff x="0" y="0"/>
+          <a:chExt cx="0" cy="0"/>
+        </a:xfrm>
+      </p:grpSpPr>
+      <p:sp>
+        <p:nvSpPr>
+          <p:cNvPr id="2" name="Slide Image Placeholder 1"/>
+          <p:cNvSpPr>
+            <a:spLocks noGrp="1" noRot="1" noChangeAspect="1"/>
+          </p:cNvSpPr>
+          <p:nvPr>
+            <p:ph type="sldImg"/>
+          </p:nvPr>
+        </p:nvSpPr>
+        <p:spPr/>
+      </p:sp>
+      <p:sp>
+        <p:nvSpPr>
+          <p:cNvPr id="3" name="Notes Placeholder 2"/>
+          <p:cNvSpPr>
+            <a:spLocks noGrp="1"/>
+          </p:cNvSpPr>
+          <p:nvPr>
+            <p:ph type="body" idx="1"/>
+          </p:nvPr>
+        </p:nvSpPr>
+        <p:spPr/>
+        <p:txBody>
+          <a:bodyPr/>
+          <a:lstStyle/>
+          <a:p>
+            <a:r>
+              <a:rPr lang="en-US" dirty="0" smtClean="0"/>
+              <a:t>Madison’s blog. </a:t>
+            </a:r>
+            <a:r>
+              <a:rPr lang="en-US" sz="1200" kern="1200" dirty="0" smtClean="0">
+                <a:solidFill>
+                  <a:schemeClr val="tx1"/>
+                </a:solidFill>
+                <a:effectLst/>
+                <a:latin typeface="+mn-lt"/>
+                <a:ea typeface="+mn-ea"/>
+                <a:cs typeface="+mn-cs"/>
+              </a:rPr>
+              <a:t>Nick Horton (personal communication) requires his students to reflect via a Google form with a mechanism running in the background to inform him if they didn’t do it!</a:t>
+            </a:r>
+            <a:r>
+              <a:rPr lang="en-US" dirty="0" smtClean="0">
+                <a:effectLst/>
+              </a:rPr>
+              <a:t> </a:t>
+            </a:r>
+            <a:endParaRPr lang="en-US" dirty="0"/>
+          </a:p>
+        </p:txBody>
+      </p:sp>
+      <p:sp>
+        <p:nvSpPr>
+          <p:cNvPr id="4" name="Slide Number Placeholder 3"/>
+          <p:cNvSpPr>
+            <a:spLocks noGrp="1"/>
+          </p:cNvSpPr>
+          <p:nvPr>
+            <p:ph type="sldNum" sz="quarter" idx="10"/>
+          </p:nvPr>
+        </p:nvSpPr>
+        <p:spPr/>
+        <p:txBody>
+          <a:bodyPr/>
+          <a:lstStyle/>
+          <a:p>
+            <a:fld id="{319DAD61-181C-6A4B-864E-25751DEDD2BB}" type="slidenum">
+              <a:rPr lang="en-US" smtClean="0"/>
+              <a:t>8</a:t>
+            </a:fld>
+            <a:endParaRPr lang="en-US"/>
+          </a:p>
+        </p:txBody>
+      </p:sp>
+    </p:spTree>
+    <p:extLst>
+      <p:ext uri="{BB962C8B-B14F-4D97-AF65-F5344CB8AC3E}">
+        <p14:creationId xmlns:p14="http://schemas.microsoft.com/office/powerpoint/2010/main" val="229971640"/>
+      </p:ext>
+    </p:extLst>
+  </p:cSld>
+  <p:clrMapOvr>
+    <a:masterClrMapping/>
+  </p:clrMapOvr>
+</p:notes>
+</file>
+
+<file path=ppt/notesSlides/notesSlide4.xml><?xml version="1.0" encoding="utf-8"?>
+<p:notes xmlns:a="http://schemas.openxmlformats.org/drawingml/2006/main" xmlns:r="http://schemas.openxmlformats.org/officeDocument/2006/relationships" xmlns:p="http://schemas.openxmlformats.org/presentationml/2006/main">
+  <p:cSld>
+    <p:spTree>
+      <p:nvGrpSpPr>
+        <p:cNvPr id="1" name=""/>
+        <p:cNvGrpSpPr/>
+        <p:nvPr/>
+      </p:nvGrpSpPr>
+      <p:grpSpPr>
+        <a:xfrm>
+          <a:off x="0" y="0"/>
+          <a:ext cx="0" cy="0"/>
+          <a:chOff x="0" y="0"/>
+          <a:chExt cx="0" cy="0"/>
+        </a:xfrm>
+      </p:grpSpPr>
+      <p:sp>
+        <p:nvSpPr>
+          <p:cNvPr id="2" name="Slide Image Placeholder 1"/>
+          <p:cNvSpPr>
+            <a:spLocks noGrp="1" noRot="1" noChangeAspect="1"/>
+          </p:cNvSpPr>
+          <p:nvPr>
+            <p:ph type="sldImg"/>
+          </p:nvPr>
+        </p:nvSpPr>
+        <p:spPr/>
+      </p:sp>
+      <p:sp>
+        <p:nvSpPr>
+          <p:cNvPr id="3" name="Notes Placeholder 2"/>
+          <p:cNvSpPr>
+            <a:spLocks noGrp="1"/>
+          </p:cNvSpPr>
+          <p:nvPr>
+            <p:ph type="body" idx="1"/>
+          </p:nvPr>
+        </p:nvSpPr>
+        <p:spPr/>
+        <p:txBody>
+          <a:bodyPr/>
+          <a:lstStyle/>
+          <a:p>
+            <a:pPr marL="0" marR="0" indent="0" algn="l" defTabSz="457200" rtl="0" eaLnBrk="1" fontAlgn="auto" latinLnBrk="0" hangingPunct="1">
+              <a:lnSpc>
+                <a:spcPct val="100000"/>
+              </a:lnSpc>
+              <a:spcBef>
+                <a:spcPts val="0"/>
+              </a:spcBef>
+              <a:spcAft>
+                <a:spcPts val="0"/>
+              </a:spcAft>
+              <a:buClrTx/>
+              <a:buSzTx/>
+              <a:buFontTx/>
+              <a:buNone/>
+              <a:tabLst/>
+              <a:defRPr/>
+            </a:pPr>
+            <a:r>
+              <a:rPr lang="en-US" sz="1200" kern="1200" dirty="0" smtClean="0">
+                <a:solidFill>
+                  <a:schemeClr val="tx1"/>
+                </a:solidFill>
+                <a:effectLst/>
+                <a:latin typeface="+mn-lt"/>
+                <a:ea typeface="+mn-ea"/>
+                <a:cs typeface="+mn-cs"/>
+              </a:rPr>
+              <a:t>Or working with new software programs (e.g., the quo function in </a:t>
+            </a:r>
+            <a:r>
+              <a:rPr lang="en-US" sz="1200" kern="1200" dirty="0" err="1" smtClean="0">
+                <a:solidFill>
+                  <a:schemeClr val="tx1"/>
+                </a:solidFill>
+                <a:effectLst/>
+                <a:latin typeface="+mn-lt"/>
+                <a:ea typeface="+mn-ea"/>
+                <a:cs typeface="+mn-cs"/>
+              </a:rPr>
+              <a:t>dplyr</a:t>
+            </a:r>
+            <a:r>
+              <a:rPr lang="en-US" sz="1200" kern="1200" dirty="0" smtClean="0">
+                <a:solidFill>
+                  <a:schemeClr val="tx1"/>
+                </a:solidFill>
+                <a:effectLst/>
+                <a:latin typeface="+mn-lt"/>
+                <a:ea typeface="+mn-ea"/>
+                <a:cs typeface="+mn-cs"/>
+              </a:rPr>
+              <a:t> version 0.7.1 as of June 22, 2017) can give the student a sense of being part of a larger community of statisticians and data scientists.</a:t>
+            </a:r>
+          </a:p>
+          <a:p>
+            <a:endParaRPr lang="en-US" dirty="0"/>
+          </a:p>
+        </p:txBody>
+      </p:sp>
+      <p:sp>
+        <p:nvSpPr>
+          <p:cNvPr id="4" name="Slide Number Placeholder 3"/>
+          <p:cNvSpPr>
+            <a:spLocks noGrp="1"/>
+          </p:cNvSpPr>
+          <p:nvPr>
+            <p:ph type="sldNum" sz="quarter" idx="10"/>
+          </p:nvPr>
+        </p:nvSpPr>
+        <p:spPr/>
+        <p:txBody>
+          <a:bodyPr/>
+          <a:lstStyle/>
+          <a:p>
+            <a:fld id="{319DAD61-181C-6A4B-864E-25751DEDD2BB}" type="slidenum">
+              <a:rPr lang="en-US" smtClean="0"/>
+              <a:t>9</a:t>
+            </a:fld>
+            <a:endParaRPr lang="en-US"/>
+          </a:p>
+        </p:txBody>
+      </p:sp>
+    </p:spTree>
+    <p:extLst>
+      <p:ext uri="{BB962C8B-B14F-4D97-AF65-F5344CB8AC3E}">
+        <p14:creationId xmlns:p14="http://schemas.microsoft.com/office/powerpoint/2010/main" val="2943228835"/>
+      </p:ext>
+    </p:extLst>
+  </p:cSld>
+  <p:clrMapOvr>
+    <a:masterClrMapping/>
+  </p:clrMapOvr>
+</p:notes>
 </file>
 
 <file path=ppt/slideLayouts/slideLayout1.xml><?xml version="1.0" encoding="utf-8"?>
@@ -406,7 +1306,7 @@
           <a:p>
             <a:fld id="{A2F0292D-1797-49A5-8D2D-8D50C72EF3CC}" type="datetimeFigureOut">
               <a:rPr lang="en-US" smtClean="0"/>
-              <a:t>7/5/17</a:t>
+              <a:t>7/10/17</a:t>
             </a:fld>
             <a:endParaRPr lang="en-US"/>
           </a:p>
@@ -885,7 +1785,7 @@
           <a:p>
             <a:fld id="{A2F0292D-1797-49A5-8D2D-8D50C72EF3CC}" type="datetimeFigureOut">
               <a:rPr lang="en-US" smtClean="0"/>
-              <a:t>7/5/17</a:t>
+              <a:t>7/10/17</a:t>
             </a:fld>
             <a:endParaRPr lang="en-US"/>
           </a:p>
@@ -1114,7 +2014,7 @@
           <a:p>
             <a:fld id="{A2F0292D-1797-49A5-8D2D-8D50C72EF3CC}" type="datetimeFigureOut">
               <a:rPr lang="en-US" smtClean="0"/>
-              <a:t>7/5/17</a:t>
+              <a:t>7/10/17</a:t>
             </a:fld>
             <a:endParaRPr lang="en-US"/>
           </a:p>
@@ -1344,7 +2244,7 @@
           <a:p>
             <a:fld id="{A2F0292D-1797-49A5-8D2D-8D50C72EF3CC}" type="datetimeFigureOut">
               <a:rPr lang="en-US" smtClean="0"/>
-              <a:t>7/5/17</a:t>
+              <a:t>7/10/17</a:t>
             </a:fld>
             <a:endParaRPr lang="en-US"/>
           </a:p>
@@ -1676,7 +2576,7 @@
           <a:p>
             <a:fld id="{A2F0292D-1797-49A5-8D2D-8D50C72EF3CC}" type="datetimeFigureOut">
               <a:rPr lang="en-US" smtClean="0"/>
-              <a:t>7/5/17</a:t>
+              <a:t>7/10/17</a:t>
             </a:fld>
             <a:endParaRPr lang="en-US"/>
           </a:p>
@@ -2034,7 +2934,7 @@
           <a:p>
             <a:fld id="{A2F0292D-1797-49A5-8D2D-8D50C72EF3CC}" type="datetimeFigureOut">
               <a:rPr lang="en-US" smtClean="0"/>
-              <a:t>7/5/17</a:t>
+              <a:t>7/10/17</a:t>
             </a:fld>
             <a:endParaRPr lang="en-US"/>
           </a:p>
@@ -2510,7 +3410,7 @@
           <a:p>
             <a:fld id="{A2F0292D-1797-49A5-8D2D-8D50C72EF3CC}" type="datetimeFigureOut">
               <a:rPr lang="en-US" smtClean="0"/>
-              <a:t>7/5/17</a:t>
+              <a:t>7/10/17</a:t>
             </a:fld>
             <a:endParaRPr lang="en-US"/>
           </a:p>
@@ -3191,7 +4091,7 @@
           <a:p>
             <a:fld id="{A2F0292D-1797-49A5-8D2D-8D50C72EF3CC}" type="datetimeFigureOut">
               <a:rPr lang="en-US" smtClean="0"/>
-              <a:t>7/5/17</a:t>
+              <a:t>7/10/17</a:t>
             </a:fld>
             <a:endParaRPr lang="en-US"/>
           </a:p>
@@ -3370,7 +4270,7 @@
           <a:p>
             <a:fld id="{A2F0292D-1797-49A5-8D2D-8D50C72EF3CC}" type="datetimeFigureOut">
               <a:rPr lang="en-US" smtClean="0"/>
-              <a:t>7/5/17</a:t>
+              <a:t>7/10/17</a:t>
             </a:fld>
             <a:endParaRPr lang="en-US"/>
           </a:p>
@@ -3541,7 +4441,7 @@
           <a:p>
             <a:fld id="{A2F0292D-1797-49A5-8D2D-8D50C72EF3CC}" type="datetimeFigureOut">
               <a:rPr lang="en-US" smtClean="0"/>
-              <a:t>7/5/17</a:t>
+              <a:t>7/10/17</a:t>
             </a:fld>
             <a:endParaRPr lang="en-US"/>
           </a:p>
@@ -3631,7 +4531,7 @@
           <a:p>
             <a:fld id="{A2F0292D-1797-49A5-8D2D-8D50C72EF3CC}" type="datetimeFigureOut">
               <a:rPr lang="en-US" smtClean="0"/>
-              <a:t>7/5/17</a:t>
+              <a:t>7/10/17</a:t>
             </a:fld>
             <a:endParaRPr lang="en-US"/>
           </a:p>
@@ -4653,7 +5553,7 @@
           <a:p>
             <a:fld id="{A2F0292D-1797-49A5-8D2D-8D50C72EF3CC}" type="datetimeFigureOut">
               <a:rPr lang="en-US" smtClean="0"/>
-              <a:t>7/5/17</a:t>
+              <a:t>7/10/17</a:t>
             </a:fld>
             <a:endParaRPr lang="en-US"/>
           </a:p>
@@ -5228,7 +6128,7 @@
           <a:p>
             <a:fld id="{A2F0292D-1797-49A5-8D2D-8D50C72EF3CC}" type="datetimeFigureOut">
               <a:rPr lang="en-US" smtClean="0"/>
-              <a:t>7/5/17</a:t>
+              <a:t>7/10/17</a:t>
             </a:fld>
             <a:endParaRPr lang="en-US"/>
           </a:p>
@@ -5736,7 +6636,7 @@
           <a:p>
             <a:fld id="{A2F0292D-1797-49A5-8D2D-8D50C72EF3CC}" type="datetimeFigureOut">
               <a:rPr lang="en-US" smtClean="0"/>
-              <a:t>7/5/17</a:t>
+              <a:t>7/10/17</a:t>
             </a:fld>
             <a:endParaRPr lang="en-US"/>
           </a:p>
@@ -6156,7 +7056,7 @@
           <a:p>
             <a:fld id="{A2F0292D-1797-49A5-8D2D-8D50C72EF3CC}" type="datetimeFigureOut">
               <a:rPr lang="en-US" smtClean="0"/>
-              <a:t>7/5/17</a:t>
+              <a:t>7/10/17</a:t>
             </a:fld>
             <a:endParaRPr lang="en-US"/>
           </a:p>
@@ -6520,7 +7420,7 @@
           <a:p>
             <a:fld id="{A2F0292D-1797-49A5-8D2D-8D50C72EF3CC}" type="datetimeFigureOut">
               <a:rPr lang="en-US" smtClean="0"/>
-              <a:t>7/5/17</a:t>
+              <a:t>7/10/17</a:t>
             </a:fld>
             <a:endParaRPr lang="en-US"/>
           </a:p>
@@ -7066,7 +7966,7 @@
           <a:p>
             <a:fld id="{A2F0292D-1797-49A5-8D2D-8D50C72EF3CC}" type="datetimeFigureOut">
               <a:rPr lang="en-US" smtClean="0"/>
-              <a:t>7/5/17</a:t>
+              <a:t>7/10/17</a:t>
             </a:fld>
             <a:endParaRPr lang="en-US"/>
           </a:p>
@@ -7179,7 +8079,7 @@
           <a:p>
             <a:fld id="{A2F0292D-1797-49A5-8D2D-8D50C72EF3CC}" type="datetimeFigureOut">
               <a:rPr lang="en-US" smtClean="0"/>
-              <a:t>7/5/17</a:t>
+              <a:t>7/10/17</a:t>
             </a:fld>
             <a:endParaRPr lang="en-US"/>
           </a:p>
@@ -8221,6 +9121,30 @@
               <a:rPr lang="en-US" dirty="0" err="1" smtClean="0"/>
               <a:t>GitHub</a:t>
             </a:r>
+            <a:r>
+              <a:rPr lang="en-US" dirty="0" smtClean="0"/>
+              <a:t> (</a:t>
+            </a:r>
+            <a:r>
+              <a:rPr lang="en-US" dirty="0"/>
+              <a:t>http://</a:t>
+            </a:r>
+            <a:r>
+              <a:rPr lang="en-US" dirty="0" err="1"/>
+              <a:t>happygitwithr.com</a:t>
+            </a:r>
+            <a:r>
+              <a:rPr lang="en-US" dirty="0"/>
+              <a:t>/</a:t>
+            </a:r>
+            <a:r>
+              <a:rPr lang="en-US" dirty="0"/>
+              <a:t> </a:t>
+            </a:r>
+            <a:r>
+              <a:rPr lang="en-US" dirty="0" smtClean="0"/>
+              <a:t>)</a:t>
+            </a:r>
             <a:endParaRPr lang="en-US" dirty="0" smtClean="0"/>
           </a:p>
           <a:p>
@@ -9917,4 +10841,324 @@
   </a:objectDefaults>
   <a:extraClrSchemeLst/>
 </a:theme>
+</file>
+
+<file path=ppt/theme/theme2.xml><?xml version="1.0" encoding="utf-8"?>
+<a:theme xmlns:a="http://schemas.openxmlformats.org/drawingml/2006/main" name="Office Theme">
+  <a:themeElements>
+    <a:clrScheme name="Office">
+      <a:dk1>
+        <a:sysClr val="windowText" lastClr="000000"/>
+      </a:dk1>
+      <a:lt1>
+        <a:sysClr val="window" lastClr="FFFFFF"/>
+      </a:lt1>
+      <a:dk2>
+        <a:srgbClr val="1F497D"/>
+      </a:dk2>
+      <a:lt2>
+        <a:srgbClr val="EEECE1"/>
+      </a:lt2>
+      <a:accent1>
+        <a:srgbClr val="4F81BD"/>
+      </a:accent1>
+      <a:accent2>
+        <a:srgbClr val="C0504D"/>
+      </a:accent2>
+      <a:accent3>
+        <a:srgbClr val="9BBB59"/>
+      </a:accent3>
+      <a:accent4>
+        <a:srgbClr val="8064A2"/>
+      </a:accent4>
+      <a:accent5>
+        <a:srgbClr val="4BACC6"/>
+      </a:accent5>
+      <a:accent6>
+        <a:srgbClr val="F79646"/>
+      </a:accent6>
+      <a:hlink>
+        <a:srgbClr val="0000FF"/>
+      </a:hlink>
+      <a:folHlink>
+        <a:srgbClr val="800080"/>
+      </a:folHlink>
+    </a:clrScheme>
+    <a:fontScheme name="Office">
+      <a:majorFont>
+        <a:latin typeface="Calibri"/>
+        <a:ea typeface=""/>
+        <a:cs typeface=""/>
+        <a:font script="Jpan" typeface="ＭＳ Ｐゴシック"/>
+        <a:font script="Hang" typeface="맑은 고딕"/>
+        <a:font script="Hans" typeface="宋体"/>
+        <a:font script="Hant" typeface="新細明體"/>
+        <a:font script="Arab" typeface="Times New Roman"/>
+        <a:font script="Hebr" typeface="Times New Roman"/>
+        <a:font script="Thai" typeface="Angsana New"/>
+        <a:font script="Ethi" typeface="Nyala"/>
+        <a:font script="Beng" typeface="Vrinda"/>
+        <a:font script="Gujr" typeface="Shruti"/>
+        <a:font script="Khmr" typeface="MoolBoran"/>
+        <a:font script="Knda" typeface="Tunga"/>
+        <a:font script="Guru" typeface="Raavi"/>
+        <a:font script="Cans" typeface="Euphemia"/>
+        <a:font script="Cher" typeface="Plantagenet Cherokee"/>
+        <a:font script="Yiii" typeface="Microsoft Yi Baiti"/>
+        <a:font script="Tibt" typeface="Microsoft Himalaya"/>
+        <a:font script="Thaa" typeface="MV Boli"/>
+        <a:font script="Deva" typeface="Mangal"/>
+        <a:font script="Telu" typeface="Gautami"/>
+        <a:font script="Taml" typeface="Latha"/>
+        <a:font script="Syrc" typeface="Estrangelo Edessa"/>
+        <a:font script="Orya" typeface="Kalinga"/>
+        <a:font script="Mlym" typeface="Kartika"/>
+        <a:font script="Laoo" typeface="DokChampa"/>
+        <a:font script="Sinh" typeface="Iskoola Pota"/>
+        <a:font script="Mong" typeface="Mongolian Baiti"/>
+        <a:font script="Viet" typeface="Times New Roman"/>
+        <a:font script="Uigh" typeface="Microsoft Uighur"/>
+        <a:font script="Geor" typeface="Sylfaen"/>
+      </a:majorFont>
+      <a:minorFont>
+        <a:latin typeface="Calibri"/>
+        <a:ea typeface=""/>
+        <a:cs typeface=""/>
+        <a:font script="Jpan" typeface="ＭＳ Ｐゴシック"/>
+        <a:font script="Hang" typeface="맑은 고딕"/>
+        <a:font script="Hans" typeface="宋体"/>
+        <a:font script="Hant" typeface="新細明體"/>
+        <a:font script="Arab" typeface="Arial"/>
+        <a:font script="Hebr" typeface="Arial"/>
+        <a:font script="Thai" typeface="Cordia New"/>
+        <a:font script="Ethi" typeface="Nyala"/>
+        <a:font script="Beng" typeface="Vrinda"/>
+        <a:font script="Gujr" typeface="Shruti"/>
+        <a:font script="Khmr" typeface="DaunPenh"/>
+        <a:font script="Knda" typeface="Tunga"/>
+        <a:font script="Guru" typeface="Raavi"/>
+        <a:font script="Cans" typeface="Euphemia"/>
+        <a:font script="Cher" typeface="Plantagenet Cherokee"/>
+        <a:font script="Yiii" typeface="Microsoft Yi Baiti"/>
+        <a:font script="Tibt" typeface="Microsoft Himalaya"/>
+        <a:font script="Thaa" typeface="MV Boli"/>
+        <a:font script="Deva" typeface="Mangal"/>
+        <a:font script="Telu" typeface="Gautami"/>
+        <a:font script="Taml" typeface="Latha"/>
+        <a:font script="Syrc" typeface="Estrangelo Edessa"/>
+        <a:font script="Orya" typeface="Kalinga"/>
+        <a:font script="Mlym" typeface="Kartika"/>
+        <a:font script="Laoo" typeface="DokChampa"/>
+        <a:font script="Sinh" typeface="Iskoola Pota"/>
+        <a:font script="Mong" typeface="Mongolian Baiti"/>
+        <a:font script="Viet" typeface="Arial"/>
+        <a:font script="Uigh" typeface="Microsoft Uighur"/>
+        <a:font script="Geor" typeface="Sylfaen"/>
+      </a:minorFont>
+    </a:fontScheme>
+    <a:fmtScheme name="Office">
+      <a:fillStyleLst>
+        <a:solidFill>
+          <a:schemeClr val="phClr"/>
+        </a:solidFill>
+        <a:gradFill rotWithShape="1">
+          <a:gsLst>
+            <a:gs pos="0">
+              <a:schemeClr val="phClr">
+                <a:tint val="50000"/>
+                <a:satMod val="300000"/>
+              </a:schemeClr>
+            </a:gs>
+            <a:gs pos="35000">
+              <a:schemeClr val="phClr">
+                <a:tint val="37000"/>
+                <a:satMod val="300000"/>
+              </a:schemeClr>
+            </a:gs>
+            <a:gs pos="100000">
+              <a:schemeClr val="phClr">
+                <a:tint val="15000"/>
+                <a:satMod val="350000"/>
+              </a:schemeClr>
+            </a:gs>
+          </a:gsLst>
+          <a:lin ang="16200000" scaled="1"/>
+        </a:gradFill>
+        <a:gradFill rotWithShape="1">
+          <a:gsLst>
+            <a:gs pos="0">
+              <a:schemeClr val="phClr">
+                <a:tint val="100000"/>
+                <a:shade val="100000"/>
+                <a:satMod val="130000"/>
+              </a:schemeClr>
+            </a:gs>
+            <a:gs pos="100000">
+              <a:schemeClr val="phClr">
+                <a:tint val="50000"/>
+                <a:shade val="100000"/>
+                <a:satMod val="350000"/>
+              </a:schemeClr>
+            </a:gs>
+          </a:gsLst>
+          <a:lin ang="16200000" scaled="0"/>
+        </a:gradFill>
+      </a:fillStyleLst>
+      <a:lnStyleLst>
+        <a:ln w="9525" cap="flat" cmpd="sng" algn="ctr">
+          <a:solidFill>
+            <a:schemeClr val="phClr">
+              <a:shade val="95000"/>
+              <a:satMod val="105000"/>
+            </a:schemeClr>
+          </a:solidFill>
+          <a:prstDash val="solid"/>
+        </a:ln>
+        <a:ln w="25400" cap="flat" cmpd="sng" algn="ctr">
+          <a:solidFill>
+            <a:schemeClr val="phClr"/>
+          </a:solidFill>
+          <a:prstDash val="solid"/>
+        </a:ln>
+        <a:ln w="38100" cap="flat" cmpd="sng" algn="ctr">
+          <a:solidFill>
+            <a:schemeClr val="phClr"/>
+          </a:solidFill>
+          <a:prstDash val="solid"/>
+        </a:ln>
+      </a:lnStyleLst>
+      <a:effectStyleLst>
+        <a:effectStyle>
+          <a:effectLst>
+            <a:outerShdw blurRad="40000" dist="20000" dir="5400000" rotWithShape="0">
+              <a:srgbClr val="000000">
+                <a:alpha val="38000"/>
+              </a:srgbClr>
+            </a:outerShdw>
+          </a:effectLst>
+        </a:effectStyle>
+        <a:effectStyle>
+          <a:effectLst>
+            <a:outerShdw blurRad="40000" dist="23000" dir="5400000" rotWithShape="0">
+              <a:srgbClr val="000000">
+                <a:alpha val="35000"/>
+              </a:srgbClr>
+            </a:outerShdw>
+          </a:effectLst>
+        </a:effectStyle>
+        <a:effectStyle>
+          <a:effectLst>
+            <a:outerShdw blurRad="40000" dist="23000" dir="5400000" rotWithShape="0">
+              <a:srgbClr val="000000">
+                <a:alpha val="35000"/>
+              </a:srgbClr>
+            </a:outerShdw>
+          </a:effectLst>
+          <a:scene3d>
+            <a:camera prst="orthographicFront">
+              <a:rot lat="0" lon="0" rev="0"/>
+            </a:camera>
+            <a:lightRig rig="threePt" dir="t">
+              <a:rot lat="0" lon="0" rev="1200000"/>
+            </a:lightRig>
+          </a:scene3d>
+          <a:sp3d>
+            <a:bevelT w="63500" h="25400"/>
+          </a:sp3d>
+        </a:effectStyle>
+      </a:effectStyleLst>
+      <a:bgFillStyleLst>
+        <a:solidFill>
+          <a:schemeClr val="phClr"/>
+        </a:solidFill>
+        <a:gradFill rotWithShape="1">
+          <a:gsLst>
+            <a:gs pos="0">
+              <a:schemeClr val="phClr">
+                <a:tint val="40000"/>
+                <a:satMod val="350000"/>
+              </a:schemeClr>
+            </a:gs>
+            <a:gs pos="40000">
+              <a:schemeClr val="phClr">
+                <a:tint val="45000"/>
+                <a:shade val="99000"/>
+                <a:satMod val="350000"/>
+              </a:schemeClr>
+            </a:gs>
+            <a:gs pos="100000">
+              <a:schemeClr val="phClr">
+                <a:shade val="20000"/>
+                <a:satMod val="255000"/>
+              </a:schemeClr>
+            </a:gs>
+          </a:gsLst>
+          <a:path path="circle">
+            <a:fillToRect l="50000" t="-80000" r="50000" b="180000"/>
+          </a:path>
+        </a:gradFill>
+        <a:gradFill rotWithShape="1">
+          <a:gsLst>
+            <a:gs pos="0">
+              <a:schemeClr val="phClr">
+                <a:tint val="80000"/>
+                <a:satMod val="300000"/>
+              </a:schemeClr>
+            </a:gs>
+            <a:gs pos="100000">
+              <a:schemeClr val="phClr">
+                <a:shade val="30000"/>
+                <a:satMod val="200000"/>
+              </a:schemeClr>
+            </a:gs>
+          </a:gsLst>
+          <a:path path="circle">
+            <a:fillToRect l="50000" t="50000" r="50000" b="50000"/>
+          </a:path>
+        </a:gradFill>
+      </a:bgFillStyleLst>
+    </a:fmtScheme>
+  </a:themeElements>
+  <a:objectDefaults>
+    <a:spDef>
+      <a:spPr/>
+      <a:bodyPr/>
+      <a:lstStyle/>
+      <a:style>
+        <a:lnRef idx="1">
+          <a:schemeClr val="accent1"/>
+        </a:lnRef>
+        <a:fillRef idx="3">
+          <a:schemeClr val="accent1"/>
+        </a:fillRef>
+        <a:effectRef idx="2">
+          <a:schemeClr val="accent1"/>
+        </a:effectRef>
+        <a:fontRef idx="minor">
+          <a:schemeClr val="lt1"/>
+        </a:fontRef>
+      </a:style>
+    </a:spDef>
+    <a:lnDef>
+      <a:spPr/>
+      <a:bodyPr/>
+      <a:lstStyle/>
+      <a:style>
+        <a:lnRef idx="2">
+          <a:schemeClr val="accent1"/>
+        </a:lnRef>
+        <a:fillRef idx="0">
+          <a:schemeClr val="accent1"/>
+        </a:fillRef>
+        <a:effectRef idx="1">
+          <a:schemeClr val="accent1"/>
+        </a:effectRef>
+        <a:fontRef idx="minor">
+          <a:schemeClr val="tx1"/>
+        </a:fontRef>
+      </a:style>
+    </a:lnDef>
+  </a:objectDefaults>
+  <a:extraClrSchemeLst/>
+</a:theme>
 </file>
</xml_diff>